<commit_message>
recipes for REML1, REOX1, REPL1, RESP1 -- DONE
</commit_message>
<xml_diff>
--- a/docs/dry_etch_recipes.pptx
+++ b/docs/dry_etch_recipes.pptx
@@ -5,31 +5,33 @@
     <p:sldMasterId id="2147483648" r:id="rId1"/>
   </p:sldMasterIdLst>
   <p:notesMasterIdLst>
-    <p:notesMasterId r:id="rId24"/>
+    <p:notesMasterId r:id="rId26"/>
   </p:notesMasterIdLst>
   <p:sldIdLst>
     <p:sldId id="296" r:id="rId2"/>
     <p:sldId id="297" r:id="rId3"/>
     <p:sldId id="299" r:id="rId4"/>
-    <p:sldId id="301" r:id="rId5"/>
-    <p:sldId id="302" r:id="rId6"/>
-    <p:sldId id="314" r:id="rId7"/>
-    <p:sldId id="312" r:id="rId8"/>
-    <p:sldId id="316" r:id="rId9"/>
-    <p:sldId id="315" r:id="rId10"/>
-    <p:sldId id="317" r:id="rId11"/>
-    <p:sldId id="318" r:id="rId12"/>
-    <p:sldId id="319" r:id="rId13"/>
-    <p:sldId id="320" r:id="rId14"/>
-    <p:sldId id="321" r:id="rId15"/>
-    <p:sldId id="322" r:id="rId16"/>
-    <p:sldId id="323" r:id="rId17"/>
-    <p:sldId id="324" r:id="rId18"/>
-    <p:sldId id="325" r:id="rId19"/>
-    <p:sldId id="326" r:id="rId20"/>
-    <p:sldId id="327" r:id="rId21"/>
-    <p:sldId id="328" r:id="rId22"/>
-    <p:sldId id="304" r:id="rId23"/>
+    <p:sldId id="330" r:id="rId5"/>
+    <p:sldId id="331" r:id="rId6"/>
+    <p:sldId id="301" r:id="rId7"/>
+    <p:sldId id="302" r:id="rId8"/>
+    <p:sldId id="314" r:id="rId9"/>
+    <p:sldId id="312" r:id="rId10"/>
+    <p:sldId id="316" r:id="rId11"/>
+    <p:sldId id="315" r:id="rId12"/>
+    <p:sldId id="317" r:id="rId13"/>
+    <p:sldId id="318" r:id="rId14"/>
+    <p:sldId id="319" r:id="rId15"/>
+    <p:sldId id="320" r:id="rId16"/>
+    <p:sldId id="321" r:id="rId17"/>
+    <p:sldId id="322" r:id="rId18"/>
+    <p:sldId id="323" r:id="rId19"/>
+    <p:sldId id="324" r:id="rId20"/>
+    <p:sldId id="325" r:id="rId21"/>
+    <p:sldId id="326" r:id="rId22"/>
+    <p:sldId id="327" r:id="rId23"/>
+    <p:sldId id="328" r:id="rId24"/>
+    <p:sldId id="304" r:id="rId25"/>
   </p:sldIdLst>
   <p:sldSz cx="9144000" cy="5715000" type="screen16x10"/>
   <p:notesSz cx="6858000" cy="9144000"/>
@@ -214,7 +216,7 @@
             <a:fld id="{71121809-FD35-40BA-B710-7AC126EF5B62}" type="datetimeFigureOut">
               <a:rPr lang="en-US" smtClean="0"/>
               <a:pPr/>
-              <a:t>3/31/2021</a:t>
+              <a:t>4/1/2021</a:t>
             </a:fld>
             <a:endParaRPr lang="en-US"/>
           </a:p>
@@ -662,7 +664,7 @@
             <a:fld id="{C119FEFB-A6CA-4965-B63F-F3E5A7C571A4}" type="datetimeFigureOut">
               <a:rPr lang="en-US" smtClean="0"/>
               <a:pPr/>
-              <a:t>3/31/2021</a:t>
+              <a:t>4/1/2021</a:t>
             </a:fld>
             <a:endParaRPr lang="en-IN"/>
           </a:p>
@@ -829,7 +831,7 @@
             <a:fld id="{C119FEFB-A6CA-4965-B63F-F3E5A7C571A4}" type="datetimeFigureOut">
               <a:rPr lang="en-US" smtClean="0"/>
               <a:pPr/>
-              <a:t>3/31/2021</a:t>
+              <a:t>4/1/2021</a:t>
             </a:fld>
             <a:endParaRPr lang="en-IN"/>
           </a:p>
@@ -1006,7 +1008,7 @@
             <a:fld id="{C119FEFB-A6CA-4965-B63F-F3E5A7C571A4}" type="datetimeFigureOut">
               <a:rPr lang="en-US" smtClean="0"/>
               <a:pPr/>
-              <a:t>3/31/2021</a:t>
+              <a:t>4/1/2021</a:t>
             </a:fld>
             <a:endParaRPr lang="en-IN"/>
           </a:p>
@@ -1173,7 +1175,7 @@
             <a:fld id="{C119FEFB-A6CA-4965-B63F-F3E5A7C571A4}" type="datetimeFigureOut">
               <a:rPr lang="en-US" smtClean="0"/>
               <a:pPr/>
-              <a:t>3/31/2021</a:t>
+              <a:t>4/1/2021</a:t>
             </a:fld>
             <a:endParaRPr lang="en-IN"/>
           </a:p>
@@ -1416,7 +1418,7 @@
             <a:fld id="{C119FEFB-A6CA-4965-B63F-F3E5A7C571A4}" type="datetimeFigureOut">
               <a:rPr lang="en-US" smtClean="0"/>
               <a:pPr/>
-              <a:t>3/31/2021</a:t>
+              <a:t>4/1/2021</a:t>
             </a:fld>
             <a:endParaRPr lang="en-IN"/>
           </a:p>
@@ -1701,7 +1703,7 @@
             <a:fld id="{C119FEFB-A6CA-4965-B63F-F3E5A7C571A4}" type="datetimeFigureOut">
               <a:rPr lang="en-US" smtClean="0"/>
               <a:pPr/>
-              <a:t>3/31/2021</a:t>
+              <a:t>4/1/2021</a:t>
             </a:fld>
             <a:endParaRPr lang="en-IN"/>
           </a:p>
@@ -2120,7 +2122,7 @@
             <a:fld id="{C119FEFB-A6CA-4965-B63F-F3E5A7C571A4}" type="datetimeFigureOut">
               <a:rPr lang="en-US" smtClean="0"/>
               <a:pPr/>
-              <a:t>3/31/2021</a:t>
+              <a:t>4/1/2021</a:t>
             </a:fld>
             <a:endParaRPr lang="en-IN"/>
           </a:p>
@@ -2235,7 +2237,7 @@
             <a:fld id="{C119FEFB-A6CA-4965-B63F-F3E5A7C571A4}" type="datetimeFigureOut">
               <a:rPr lang="en-US" smtClean="0"/>
               <a:pPr/>
-              <a:t>3/31/2021</a:t>
+              <a:t>4/1/2021</a:t>
             </a:fld>
             <a:endParaRPr lang="en-IN"/>
           </a:p>
@@ -2327,7 +2329,7 @@
             <a:fld id="{C119FEFB-A6CA-4965-B63F-F3E5A7C571A4}" type="datetimeFigureOut">
               <a:rPr lang="en-US" smtClean="0"/>
               <a:pPr/>
-              <a:t>3/31/2021</a:t>
+              <a:t>4/1/2021</a:t>
             </a:fld>
             <a:endParaRPr lang="en-IN"/>
           </a:p>
@@ -2601,7 +2603,7 @@
             <a:fld id="{C119FEFB-A6CA-4965-B63F-F3E5A7C571A4}" type="datetimeFigureOut">
               <a:rPr lang="en-US" smtClean="0"/>
               <a:pPr/>
-              <a:t>3/31/2021</a:t>
+              <a:t>4/1/2021</a:t>
             </a:fld>
             <a:endParaRPr lang="en-IN"/>
           </a:p>
@@ -2851,7 +2853,7 @@
             <a:fld id="{C119FEFB-A6CA-4965-B63F-F3E5A7C571A4}" type="datetimeFigureOut">
               <a:rPr lang="en-US" smtClean="0"/>
               <a:pPr/>
-              <a:t>3/31/2021</a:t>
+              <a:t>4/1/2021</a:t>
             </a:fld>
             <a:endParaRPr lang="en-IN"/>
           </a:p>
@@ -3061,7 +3063,7 @@
             <a:fld id="{C119FEFB-A6CA-4965-B63F-F3E5A7C571A4}" type="datetimeFigureOut">
               <a:rPr lang="en-US" smtClean="0"/>
               <a:pPr/>
-              <a:t>3/31/2021</a:t>
+              <a:t>4/1/2021</a:t>
             </a:fld>
             <a:endParaRPr lang="en-IN"/>
           </a:p>
@@ -3740,17 +3742,7 @@
                 <a:latin typeface="Segoe UI" pitchFamily="34" charset="0"/>
                 <a:cs typeface="Segoe UI" pitchFamily="34" charset="0"/>
               </a:rPr>
-              <a:t>Recipes </a:t>
-            </a:r>
-            <a:r>
-              <a:rPr lang="en-IN" dirty="0" smtClean="0">
-                <a:solidFill>
-                  <a:schemeClr val="bg1"/>
-                </a:solidFill>
-                <a:latin typeface="Segoe UI" pitchFamily="34" charset="0"/>
-                <a:cs typeface="Segoe UI" pitchFamily="34" charset="0"/>
-              </a:rPr>
-              <a:t>run in Equipments</a:t>
+              <a:t>Recipes run in Equipments</a:t>
             </a:r>
             <a:endParaRPr lang="en-US" dirty="0">
               <a:solidFill>
@@ -3793,17 +3785,7 @@
                   </a:schemeClr>
                 </a:solidFill>
               </a:rPr>
-              <a:t>31</a:t>
-            </a:r>
-            <a:r>
-              <a:rPr lang="en-IN" dirty="0" smtClean="0">
-                <a:solidFill>
-                  <a:schemeClr val="bg1">
-                    <a:lumMod val="65000"/>
-                  </a:schemeClr>
-                </a:solidFill>
-              </a:rPr>
-              <a:t>-Mar-2021</a:t>
+              <a:t>31-Mar-2021</a:t>
             </a:r>
             <a:endParaRPr lang="en-US" dirty="0">
               <a:solidFill>
@@ -3820,6 +3802,13 @@
   <p:clrMapOvr>
     <a:masterClrMapping/>
   </p:clrMapOvr>
+  <p:timing>
+    <p:tnLst>
+      <p:par>
+        <p:cTn id="1" dur="indefinite" restart="never" nodeType="tmRoot"/>
+      </p:par>
+    </p:tnLst>
+  </p:timing>
 </p:sld>
 </file>
 
@@ -3842,59 +3831,71 @@
       </p:grpSpPr>
       <p:sp>
         <p:nvSpPr>
-          <p:cNvPr id="4" name="TextBox 3"/>
-          <p:cNvSpPr txBox="1"/>
-          <p:nvPr/>
+          <p:cNvPr id="4" name="Content Placeholder 3"/>
+          <p:cNvSpPr>
+            <a:spLocks noGrp="1"/>
+          </p:cNvSpPr>
+          <p:nvPr>
+            <p:ph sz="half" idx="2"/>
+          </p:nvPr>
         </p:nvSpPr>
         <p:spPr>
           <a:xfrm>
-            <a:off x="4067944" y="2641476"/>
-            <a:ext cx="1800200" cy="369332"/>
+            <a:off x="683568" y="481236"/>
+            <a:ext cx="1080120" cy="504056"/>
+          </a:xfrm>
+        </p:spPr>
+        <p:txBody>
+          <a:bodyPr>
+            <a:normAutofit/>
+          </a:bodyPr>
+          <a:lstStyle/>
+          <a:p>
+            <a:pPr>
+              <a:buNone/>
+            </a:pPr>
+            <a:r>
+              <a:rPr lang="en-IN" sz="1800" b="1" dirty="0" smtClean="0">
+                <a:latin typeface="Segoe UI" pitchFamily="34" charset="0"/>
+                <a:cs typeface="Segoe UI" pitchFamily="34" charset="0"/>
+              </a:rPr>
+              <a:t>Recipes</a:t>
+            </a:r>
+          </a:p>
+        </p:txBody>
+      </p:sp>
+      <p:pic>
+        <p:nvPicPr>
+          <p:cNvPr id="2050" name="Picture 2"/>
+          <p:cNvPicPr>
+            <a:picLocks noChangeAspect="1" noChangeArrowheads="1"/>
+          </p:cNvPicPr>
+          <p:nvPr/>
+        </p:nvPicPr>
+        <p:blipFill>
+          <a:blip r:embed="rId2" cstate="print"/>
+          <a:srcRect l="5529" t="4803" r="6012" b="3912"/>
+          <a:stretch>
+            <a:fillRect/>
+          </a:stretch>
+        </p:blipFill>
+        <p:spPr bwMode="auto">
+          <a:xfrm>
+            <a:off x="3059832" y="121195"/>
+            <a:ext cx="3816424" cy="5565619"/>
           </a:xfrm>
           <a:prstGeom prst="rect">
             <a:avLst/>
           </a:prstGeom>
-          <a:solidFill>
-            <a:schemeClr val="accent1"/>
-          </a:solidFill>
-          <a:ln>
+          <a:noFill/>
+          <a:ln w="9525">
             <a:noFill/>
+            <a:miter lim="800000"/>
+            <a:headEnd/>
+            <a:tailEnd/>
           </a:ln>
-          <a:effectLst>
-            <a:outerShdw blurRad="50800" dist="38100" dir="2700000" algn="tl" rotWithShape="0">
-              <a:prstClr val="black">
-                <a:alpha val="40000"/>
-              </a:prstClr>
-            </a:outerShdw>
-          </a:effectLst>
         </p:spPr>
-        <p:txBody>
-          <a:bodyPr wrap="square" rtlCol="0">
-            <a:spAutoFit/>
-          </a:bodyPr>
-          <a:lstStyle/>
-          <a:p>
-            <a:pPr algn="ctr"/>
-            <a:r>
-              <a:rPr lang="en-IN" dirty="0" smtClean="0">
-                <a:solidFill>
-                  <a:schemeClr val="bg1"/>
-                </a:solidFill>
-                <a:latin typeface="Segoe UI" pitchFamily="34" charset="0"/>
-                <a:cs typeface="Segoe UI" pitchFamily="34" charset="0"/>
-              </a:rPr>
-              <a:t>REML1</a:t>
-            </a:r>
-            <a:endParaRPr lang="en-US" dirty="0">
-              <a:solidFill>
-                <a:schemeClr val="bg1"/>
-              </a:solidFill>
-              <a:latin typeface="Segoe UI" pitchFamily="34" charset="0"/>
-              <a:cs typeface="Segoe UI" pitchFamily="34" charset="0"/>
-            </a:endParaRPr>
-          </a:p>
-        </p:txBody>
-      </p:sp>
+      </p:pic>
     </p:spTree>
   </p:cSld>
   <p:clrMapOvr>
@@ -3940,7 +3941,7 @@
         <p:spPr>
           <a:xfrm>
             <a:off x="683568" y="481236"/>
-            <a:ext cx="1080120" cy="504056"/>
+            <a:ext cx="1512168" cy="504056"/>
           </a:xfrm>
         </p:spPr>
         <p:txBody>
@@ -3957,12 +3958,8 @@
                 <a:latin typeface="Segoe UI" pitchFamily="34" charset="0"/>
                 <a:cs typeface="Segoe UI" pitchFamily="34" charset="0"/>
               </a:rPr>
-              <a:t>Recipes</a:t>
-            </a:r>
-            <a:endParaRPr lang="en-IN" sz="1800" b="1" dirty="0" smtClean="0">
-              <a:latin typeface="Segoe UI" pitchFamily="34" charset="0"/>
-              <a:cs typeface="Segoe UI" pitchFamily="34" charset="0"/>
-            </a:endParaRPr>
+              <a:t>Frequency</a:t>
+            </a:r>
           </a:p>
         </p:txBody>
       </p:sp>
@@ -4000,37 +3997,53 @@
       </p:grpSpPr>
       <p:sp>
         <p:nvSpPr>
-          <p:cNvPr id="4" name="Content Placeholder 3"/>
-          <p:cNvSpPr>
-            <a:spLocks noGrp="1"/>
-          </p:cNvSpPr>
-          <p:nvPr>
-            <p:ph sz="half" idx="2"/>
-          </p:nvPr>
+          <p:cNvPr id="4" name="TextBox 3"/>
+          <p:cNvSpPr txBox="1"/>
+          <p:nvPr/>
         </p:nvSpPr>
         <p:spPr>
           <a:xfrm>
-            <a:off x="683568" y="481236"/>
-            <a:ext cx="1512168" cy="504056"/>
+            <a:off x="4067944" y="2641476"/>
+            <a:ext cx="1800200" cy="369332"/>
           </a:xfrm>
+          <a:prstGeom prst="rect">
+            <a:avLst/>
+          </a:prstGeom>
+          <a:solidFill>
+            <a:schemeClr val="accent1"/>
+          </a:solidFill>
+          <a:ln>
+            <a:noFill/>
+          </a:ln>
+          <a:effectLst>
+            <a:outerShdw blurRad="50800" dist="38100" dir="2700000" algn="tl" rotWithShape="0">
+              <a:prstClr val="black">
+                <a:alpha val="40000"/>
+              </a:prstClr>
+            </a:outerShdw>
+          </a:effectLst>
         </p:spPr>
         <p:txBody>
-          <a:bodyPr>
-            <a:normAutofit/>
+          <a:bodyPr wrap="square" rtlCol="0">
+            <a:spAutoFit/>
           </a:bodyPr>
           <a:lstStyle/>
           <a:p>
-            <a:pPr>
-              <a:buNone/>
-            </a:pPr>
-            <a:r>
-              <a:rPr lang="en-IN" sz="1800" b="1" dirty="0" smtClean="0">
+            <a:pPr algn="ctr"/>
+            <a:r>
+              <a:rPr lang="en-IN" dirty="0" smtClean="0">
+                <a:solidFill>
+                  <a:schemeClr val="bg1"/>
+                </a:solidFill>
                 <a:latin typeface="Segoe UI" pitchFamily="34" charset="0"/>
                 <a:cs typeface="Segoe UI" pitchFamily="34" charset="0"/>
               </a:rPr>
-              <a:t>Frequency</a:t>
-            </a:r>
-            <a:endParaRPr lang="en-IN" sz="1800" b="1" dirty="0" smtClean="0">
+              <a:t>REML1</a:t>
+            </a:r>
+            <a:endParaRPr lang="en-US" dirty="0">
+              <a:solidFill>
+                <a:schemeClr val="bg1"/>
+              </a:solidFill>
               <a:latin typeface="Segoe UI" pitchFamily="34" charset="0"/>
               <a:cs typeface="Segoe UI" pitchFamily="34" charset="0"/>
             </a:endParaRPr>
@@ -4071,56 +4084,36 @@
       </p:grpSpPr>
       <p:sp>
         <p:nvSpPr>
-          <p:cNvPr id="4" name="TextBox 3"/>
-          <p:cNvSpPr txBox="1"/>
-          <p:nvPr/>
+          <p:cNvPr id="4" name="Content Placeholder 3"/>
+          <p:cNvSpPr>
+            <a:spLocks noGrp="1"/>
+          </p:cNvSpPr>
+          <p:nvPr>
+            <p:ph sz="half" idx="2"/>
+          </p:nvPr>
         </p:nvSpPr>
         <p:spPr>
           <a:xfrm>
-            <a:off x="4067944" y="2641476"/>
-            <a:ext cx="1800200" cy="369332"/>
+            <a:off x="683568" y="481236"/>
+            <a:ext cx="1080120" cy="504056"/>
           </a:xfrm>
-          <a:prstGeom prst="rect">
-            <a:avLst/>
-          </a:prstGeom>
-          <a:solidFill>
-            <a:schemeClr val="accent6"/>
-          </a:solidFill>
-          <a:ln>
-            <a:noFill/>
-          </a:ln>
-          <a:effectLst>
-            <a:outerShdw blurRad="50800" dist="38100" dir="2700000" algn="tl" rotWithShape="0">
-              <a:prstClr val="black">
-                <a:alpha val="40000"/>
-              </a:prstClr>
-            </a:outerShdw>
-          </a:effectLst>
         </p:spPr>
         <p:txBody>
-          <a:bodyPr wrap="square" rtlCol="0">
-            <a:spAutoFit/>
+          <a:bodyPr>
+            <a:normAutofit/>
           </a:bodyPr>
           <a:lstStyle/>
           <a:p>
-            <a:pPr algn="ctr"/>
-            <a:r>
-              <a:rPr lang="en-IN" dirty="0" smtClean="0">
-                <a:solidFill>
-                  <a:schemeClr val="bg1"/>
-                </a:solidFill>
+            <a:pPr>
+              <a:buNone/>
+            </a:pPr>
+            <a:r>
+              <a:rPr lang="en-IN" sz="1800" b="1" dirty="0" smtClean="0">
                 <a:latin typeface="Segoe UI" pitchFamily="34" charset="0"/>
                 <a:cs typeface="Segoe UI" pitchFamily="34" charset="0"/>
               </a:rPr>
-              <a:t>REOX1</a:t>
-            </a:r>
-            <a:endParaRPr lang="en-US" dirty="0">
-              <a:solidFill>
-                <a:schemeClr val="bg1"/>
-              </a:solidFill>
-              <a:latin typeface="Segoe UI" pitchFamily="34" charset="0"/>
-              <a:cs typeface="Segoe UI" pitchFamily="34" charset="0"/>
-            </a:endParaRPr>
+              <a:t>Recipes</a:t>
+            </a:r>
           </a:p>
         </p:txBody>
       </p:sp>
@@ -4169,7 +4162,7 @@
         <p:spPr>
           <a:xfrm>
             <a:off x="683568" y="481236"/>
-            <a:ext cx="1080120" cy="504056"/>
+            <a:ext cx="1512168" cy="504056"/>
           </a:xfrm>
         </p:spPr>
         <p:txBody>
@@ -4186,12 +4179,8 @@
                 <a:latin typeface="Segoe UI" pitchFamily="34" charset="0"/>
                 <a:cs typeface="Segoe UI" pitchFamily="34" charset="0"/>
               </a:rPr>
-              <a:t>Recipes</a:t>
-            </a:r>
-            <a:endParaRPr lang="en-IN" sz="1800" b="1" dirty="0" smtClean="0">
-              <a:latin typeface="Segoe UI" pitchFamily="34" charset="0"/>
-              <a:cs typeface="Segoe UI" pitchFamily="34" charset="0"/>
-            </a:endParaRPr>
+              <a:t>Frequency</a:t>
+            </a:r>
           </a:p>
         </p:txBody>
       </p:sp>
@@ -4229,37 +4218,53 @@
       </p:grpSpPr>
       <p:sp>
         <p:nvSpPr>
-          <p:cNvPr id="4" name="Content Placeholder 3"/>
-          <p:cNvSpPr>
-            <a:spLocks noGrp="1"/>
-          </p:cNvSpPr>
-          <p:nvPr>
-            <p:ph sz="half" idx="2"/>
-          </p:nvPr>
+          <p:cNvPr id="4" name="TextBox 3"/>
+          <p:cNvSpPr txBox="1"/>
+          <p:nvPr/>
         </p:nvSpPr>
         <p:spPr>
           <a:xfrm>
-            <a:off x="683568" y="481236"/>
-            <a:ext cx="1512168" cy="504056"/>
+            <a:off x="4067944" y="2641476"/>
+            <a:ext cx="1800200" cy="369332"/>
           </a:xfrm>
+          <a:prstGeom prst="rect">
+            <a:avLst/>
+          </a:prstGeom>
+          <a:solidFill>
+            <a:schemeClr val="accent6"/>
+          </a:solidFill>
+          <a:ln>
+            <a:noFill/>
+          </a:ln>
+          <a:effectLst>
+            <a:outerShdw blurRad="50800" dist="38100" dir="2700000" algn="tl" rotWithShape="0">
+              <a:prstClr val="black">
+                <a:alpha val="40000"/>
+              </a:prstClr>
+            </a:outerShdw>
+          </a:effectLst>
         </p:spPr>
         <p:txBody>
-          <a:bodyPr>
-            <a:normAutofit/>
+          <a:bodyPr wrap="square" rtlCol="0">
+            <a:spAutoFit/>
           </a:bodyPr>
           <a:lstStyle/>
           <a:p>
-            <a:pPr>
-              <a:buNone/>
-            </a:pPr>
-            <a:r>
-              <a:rPr lang="en-IN" sz="1800" b="1" dirty="0" smtClean="0">
+            <a:pPr algn="ctr"/>
+            <a:r>
+              <a:rPr lang="en-IN" dirty="0" smtClean="0">
+                <a:solidFill>
+                  <a:schemeClr val="bg1"/>
+                </a:solidFill>
                 <a:latin typeface="Segoe UI" pitchFamily="34" charset="0"/>
                 <a:cs typeface="Segoe UI" pitchFamily="34" charset="0"/>
               </a:rPr>
-              <a:t>Frequency</a:t>
-            </a:r>
-            <a:endParaRPr lang="en-IN" sz="1800" b="1" dirty="0" smtClean="0">
+              <a:t>REOX1</a:t>
+            </a:r>
+            <a:endParaRPr lang="en-US" dirty="0">
+              <a:solidFill>
+                <a:schemeClr val="bg1"/>
+              </a:solidFill>
               <a:latin typeface="Segoe UI" pitchFamily="34" charset="0"/>
               <a:cs typeface="Segoe UI" pitchFamily="34" charset="0"/>
             </a:endParaRPr>
@@ -4300,56 +4305,36 @@
       </p:grpSpPr>
       <p:sp>
         <p:nvSpPr>
-          <p:cNvPr id="4" name="TextBox 3"/>
-          <p:cNvSpPr txBox="1"/>
-          <p:nvPr/>
+          <p:cNvPr id="4" name="Content Placeholder 3"/>
+          <p:cNvSpPr>
+            <a:spLocks noGrp="1"/>
+          </p:cNvSpPr>
+          <p:nvPr>
+            <p:ph sz="half" idx="2"/>
+          </p:nvPr>
         </p:nvSpPr>
         <p:spPr>
           <a:xfrm>
-            <a:off x="4067944" y="2641476"/>
-            <a:ext cx="1800200" cy="369332"/>
+            <a:off x="683568" y="481236"/>
+            <a:ext cx="1080120" cy="504056"/>
           </a:xfrm>
-          <a:prstGeom prst="rect">
-            <a:avLst/>
-          </a:prstGeom>
-          <a:solidFill>
-            <a:srgbClr val="002060"/>
-          </a:solidFill>
-          <a:ln>
-            <a:noFill/>
-          </a:ln>
-          <a:effectLst>
-            <a:outerShdw blurRad="50800" dist="38100" dir="2700000" algn="tl" rotWithShape="0">
-              <a:prstClr val="black">
-                <a:alpha val="40000"/>
-              </a:prstClr>
-            </a:outerShdw>
-          </a:effectLst>
         </p:spPr>
         <p:txBody>
-          <a:bodyPr wrap="square" rtlCol="0">
-            <a:spAutoFit/>
+          <a:bodyPr>
+            <a:normAutofit/>
           </a:bodyPr>
           <a:lstStyle/>
           <a:p>
-            <a:pPr algn="ctr"/>
-            <a:r>
-              <a:rPr lang="en-IN" dirty="0" smtClean="0">
-                <a:solidFill>
-                  <a:schemeClr val="bg1"/>
-                </a:solidFill>
+            <a:pPr>
+              <a:buNone/>
+            </a:pPr>
+            <a:r>
+              <a:rPr lang="en-IN" sz="1800" b="1" dirty="0" smtClean="0">
                 <a:latin typeface="Segoe UI" pitchFamily="34" charset="0"/>
                 <a:cs typeface="Segoe UI" pitchFamily="34" charset="0"/>
               </a:rPr>
-              <a:t>REPL1</a:t>
-            </a:r>
-            <a:endParaRPr lang="en-US" dirty="0">
-              <a:solidFill>
-                <a:schemeClr val="bg1"/>
-              </a:solidFill>
-              <a:latin typeface="Segoe UI" pitchFamily="34" charset="0"/>
-              <a:cs typeface="Segoe UI" pitchFamily="34" charset="0"/>
-            </a:endParaRPr>
+              <a:t>Recipes</a:t>
+            </a:r>
           </a:p>
         </p:txBody>
       </p:sp>
@@ -4398,7 +4383,7 @@
         <p:spPr>
           <a:xfrm>
             <a:off x="683568" y="481236"/>
-            <a:ext cx="1080120" cy="504056"/>
+            <a:ext cx="1512168" cy="504056"/>
           </a:xfrm>
         </p:spPr>
         <p:txBody>
@@ -4415,12 +4400,8 @@
                 <a:latin typeface="Segoe UI" pitchFamily="34" charset="0"/>
                 <a:cs typeface="Segoe UI" pitchFamily="34" charset="0"/>
               </a:rPr>
-              <a:t>Recipes</a:t>
-            </a:r>
-            <a:endParaRPr lang="en-IN" sz="1800" b="1" dirty="0" smtClean="0">
-              <a:latin typeface="Segoe UI" pitchFamily="34" charset="0"/>
-              <a:cs typeface="Segoe UI" pitchFamily="34" charset="0"/>
-            </a:endParaRPr>
+              <a:t>Frequency</a:t>
+            </a:r>
           </a:p>
         </p:txBody>
       </p:sp>
@@ -4458,37 +4439,53 @@
       </p:grpSpPr>
       <p:sp>
         <p:nvSpPr>
-          <p:cNvPr id="4" name="Content Placeholder 3"/>
-          <p:cNvSpPr>
-            <a:spLocks noGrp="1"/>
-          </p:cNvSpPr>
-          <p:nvPr>
-            <p:ph sz="half" idx="2"/>
-          </p:nvPr>
+          <p:cNvPr id="4" name="TextBox 3"/>
+          <p:cNvSpPr txBox="1"/>
+          <p:nvPr/>
         </p:nvSpPr>
         <p:spPr>
           <a:xfrm>
-            <a:off x="683568" y="481236"/>
-            <a:ext cx="1512168" cy="504056"/>
+            <a:off x="4067944" y="2641476"/>
+            <a:ext cx="1800200" cy="369332"/>
           </a:xfrm>
+          <a:prstGeom prst="rect">
+            <a:avLst/>
+          </a:prstGeom>
+          <a:solidFill>
+            <a:srgbClr val="002060"/>
+          </a:solidFill>
+          <a:ln>
+            <a:noFill/>
+          </a:ln>
+          <a:effectLst>
+            <a:outerShdw blurRad="50800" dist="38100" dir="2700000" algn="tl" rotWithShape="0">
+              <a:prstClr val="black">
+                <a:alpha val="40000"/>
+              </a:prstClr>
+            </a:outerShdw>
+          </a:effectLst>
         </p:spPr>
         <p:txBody>
-          <a:bodyPr>
-            <a:normAutofit/>
+          <a:bodyPr wrap="square" rtlCol="0">
+            <a:spAutoFit/>
           </a:bodyPr>
           <a:lstStyle/>
           <a:p>
-            <a:pPr>
-              <a:buNone/>
-            </a:pPr>
-            <a:r>
-              <a:rPr lang="en-IN" sz="1800" b="1" dirty="0" smtClean="0">
+            <a:pPr algn="ctr"/>
+            <a:r>
+              <a:rPr lang="en-IN" dirty="0" smtClean="0">
+                <a:solidFill>
+                  <a:schemeClr val="bg1"/>
+                </a:solidFill>
                 <a:latin typeface="Segoe UI" pitchFamily="34" charset="0"/>
                 <a:cs typeface="Segoe UI" pitchFamily="34" charset="0"/>
               </a:rPr>
-              <a:t>Frequency</a:t>
-            </a:r>
-            <a:endParaRPr lang="en-IN" sz="1800" b="1" dirty="0" smtClean="0">
+              <a:t>REPL1</a:t>
+            </a:r>
+            <a:endParaRPr lang="en-US" dirty="0">
+              <a:solidFill>
+                <a:schemeClr val="bg1"/>
+              </a:solidFill>
               <a:latin typeface="Segoe UI" pitchFamily="34" charset="0"/>
               <a:cs typeface="Segoe UI" pitchFamily="34" charset="0"/>
             </a:endParaRPr>
@@ -4529,56 +4526,36 @@
       </p:grpSpPr>
       <p:sp>
         <p:nvSpPr>
-          <p:cNvPr id="4" name="TextBox 3"/>
-          <p:cNvSpPr txBox="1"/>
-          <p:nvPr/>
+          <p:cNvPr id="4" name="Content Placeholder 3"/>
+          <p:cNvSpPr>
+            <a:spLocks noGrp="1"/>
+          </p:cNvSpPr>
+          <p:nvPr>
+            <p:ph sz="half" idx="2"/>
+          </p:nvPr>
         </p:nvSpPr>
         <p:spPr>
           <a:xfrm>
-            <a:off x="4067944" y="2641476"/>
-            <a:ext cx="1800200" cy="369332"/>
+            <a:off x="683568" y="481236"/>
+            <a:ext cx="1080120" cy="504056"/>
           </a:xfrm>
-          <a:prstGeom prst="rect">
-            <a:avLst/>
-          </a:prstGeom>
-          <a:solidFill>
-            <a:srgbClr val="00B050"/>
-          </a:solidFill>
-          <a:ln>
-            <a:noFill/>
-          </a:ln>
-          <a:effectLst>
-            <a:outerShdw blurRad="50800" dist="38100" dir="2700000" algn="tl" rotWithShape="0">
-              <a:prstClr val="black">
-                <a:alpha val="40000"/>
-              </a:prstClr>
-            </a:outerShdw>
-          </a:effectLst>
         </p:spPr>
         <p:txBody>
-          <a:bodyPr wrap="square" rtlCol="0">
-            <a:spAutoFit/>
+          <a:bodyPr>
+            <a:normAutofit/>
           </a:bodyPr>
           <a:lstStyle/>
           <a:p>
-            <a:pPr algn="ctr"/>
-            <a:r>
-              <a:rPr lang="en-IN" dirty="0" smtClean="0">
-                <a:solidFill>
-                  <a:schemeClr val="bg1"/>
-                </a:solidFill>
+            <a:pPr>
+              <a:buNone/>
+            </a:pPr>
+            <a:r>
+              <a:rPr lang="en-IN" sz="1800" b="1" dirty="0" smtClean="0">
                 <a:latin typeface="Segoe UI" pitchFamily="34" charset="0"/>
                 <a:cs typeface="Segoe UI" pitchFamily="34" charset="0"/>
               </a:rPr>
-              <a:t>RESP1</a:t>
-            </a:r>
-            <a:endParaRPr lang="en-US" dirty="0">
-              <a:solidFill>
-                <a:schemeClr val="bg1"/>
-              </a:solidFill>
-              <a:latin typeface="Segoe UI" pitchFamily="34" charset="0"/>
-              <a:cs typeface="Segoe UI" pitchFamily="34" charset="0"/>
-            </a:endParaRPr>
+              <a:t>Recipes</a:t>
+            </a:r>
           </a:p>
         </p:txBody>
       </p:sp>
@@ -4676,30 +4653,26 @@
           </a:p>
           <a:p>
             <a:r>
-              <a:rPr lang="en-IN" sz="1800" dirty="0" smtClean="0">
+              <a:rPr lang="en-IN" sz="1600" dirty="0" smtClean="0">
                 <a:latin typeface="Segoe UI" pitchFamily="34" charset="0"/>
                 <a:cs typeface="Segoe UI" pitchFamily="34" charset="0"/>
               </a:rPr>
               <a:t>The shared raw data contains the recipes used for running lots in equipment(s)/chamber(s) with </a:t>
             </a:r>
             <a:r>
-              <a:rPr lang="en-IN" sz="1800" dirty="0" err="1" smtClean="0">
+              <a:rPr lang="en-IN" sz="1600" dirty="0" err="1" smtClean="0">
                 <a:latin typeface="Segoe UI" pitchFamily="34" charset="0"/>
                 <a:cs typeface="Segoe UI" pitchFamily="34" charset="0"/>
               </a:rPr>
               <a:t>datetime</a:t>
             </a:r>
             <a:r>
-              <a:rPr lang="en-IN" sz="1800" dirty="0" smtClean="0">
+              <a:rPr lang="en-IN" sz="1600" dirty="0" smtClean="0">
                 <a:latin typeface="Segoe UI" pitchFamily="34" charset="0"/>
                 <a:cs typeface="Segoe UI" pitchFamily="34" charset="0"/>
               </a:rPr>
               <a:t>.</a:t>
             </a:r>
-            <a:endParaRPr lang="en-IN" sz="1800" dirty="0" smtClean="0">
-              <a:latin typeface="Segoe UI" pitchFamily="34" charset="0"/>
-              <a:cs typeface="Segoe UI" pitchFamily="34" charset="0"/>
-            </a:endParaRPr>
           </a:p>
           <a:p>
             <a:endParaRPr lang="en-US" dirty="0"/>
@@ -4711,6 +4684,13 @@
   <p:clrMapOvr>
     <a:masterClrMapping/>
   </p:clrMapOvr>
+  <p:timing>
+    <p:tnLst>
+      <p:par>
+        <p:cTn id="1" dur="indefinite" restart="never" nodeType="tmRoot"/>
+      </p:par>
+    </p:tnLst>
+  </p:timing>
 </p:sld>
 </file>
 
@@ -4744,7 +4724,7 @@
         <p:spPr>
           <a:xfrm>
             <a:off x="683568" y="481236"/>
-            <a:ext cx="1080120" cy="504056"/>
+            <a:ext cx="1512168" cy="504056"/>
           </a:xfrm>
         </p:spPr>
         <p:txBody>
@@ -4761,12 +4741,8 @@
                 <a:latin typeface="Segoe UI" pitchFamily="34" charset="0"/>
                 <a:cs typeface="Segoe UI" pitchFamily="34" charset="0"/>
               </a:rPr>
-              <a:t>Recipes</a:t>
-            </a:r>
-            <a:endParaRPr lang="en-IN" sz="1800" b="1" dirty="0" smtClean="0">
-              <a:latin typeface="Segoe UI" pitchFamily="34" charset="0"/>
-              <a:cs typeface="Segoe UI" pitchFamily="34" charset="0"/>
-            </a:endParaRPr>
+              <a:t>Frequency</a:t>
+            </a:r>
           </a:p>
         </p:txBody>
       </p:sp>
@@ -4804,37 +4780,53 @@
       </p:grpSpPr>
       <p:sp>
         <p:nvSpPr>
-          <p:cNvPr id="4" name="Content Placeholder 3"/>
-          <p:cNvSpPr>
-            <a:spLocks noGrp="1"/>
-          </p:cNvSpPr>
-          <p:nvPr>
-            <p:ph sz="half" idx="2"/>
-          </p:nvPr>
+          <p:cNvPr id="4" name="TextBox 3"/>
+          <p:cNvSpPr txBox="1"/>
+          <p:nvPr/>
         </p:nvSpPr>
         <p:spPr>
           <a:xfrm>
-            <a:off x="683568" y="481236"/>
-            <a:ext cx="1512168" cy="504056"/>
+            <a:off x="4067944" y="2641476"/>
+            <a:ext cx="1800200" cy="369332"/>
           </a:xfrm>
+          <a:prstGeom prst="rect">
+            <a:avLst/>
+          </a:prstGeom>
+          <a:solidFill>
+            <a:srgbClr val="00B050"/>
+          </a:solidFill>
+          <a:ln>
+            <a:noFill/>
+          </a:ln>
+          <a:effectLst>
+            <a:outerShdw blurRad="50800" dist="38100" dir="2700000" algn="tl" rotWithShape="0">
+              <a:prstClr val="black">
+                <a:alpha val="40000"/>
+              </a:prstClr>
+            </a:outerShdw>
+          </a:effectLst>
         </p:spPr>
         <p:txBody>
-          <a:bodyPr>
-            <a:normAutofit/>
+          <a:bodyPr wrap="square" rtlCol="0">
+            <a:spAutoFit/>
           </a:bodyPr>
           <a:lstStyle/>
           <a:p>
-            <a:pPr>
-              <a:buNone/>
-            </a:pPr>
-            <a:r>
-              <a:rPr lang="en-IN" sz="1800" b="1" dirty="0" smtClean="0">
+            <a:pPr algn="ctr"/>
+            <a:r>
+              <a:rPr lang="en-IN" dirty="0" smtClean="0">
+                <a:solidFill>
+                  <a:schemeClr val="bg1"/>
+                </a:solidFill>
                 <a:latin typeface="Segoe UI" pitchFamily="34" charset="0"/>
                 <a:cs typeface="Segoe UI" pitchFamily="34" charset="0"/>
               </a:rPr>
-              <a:t>Frequency</a:t>
-            </a:r>
-            <a:endParaRPr lang="en-IN" sz="1800" b="1" dirty="0" smtClean="0">
+              <a:t>RESP1</a:t>
+            </a:r>
+            <a:endParaRPr lang="en-US" dirty="0">
+              <a:solidFill>
+                <a:schemeClr val="bg1"/>
+              </a:solidFill>
               <a:latin typeface="Segoe UI" pitchFamily="34" charset="0"/>
               <a:cs typeface="Segoe UI" pitchFamily="34" charset="0"/>
             </a:endParaRPr>
@@ -4857,6 +4849,140 @@
 </file>
 
 <file path=ppt/slides/slide22.xml><?xml version="1.0" encoding="utf-8"?>
+<p:sld xmlns:a="http://schemas.openxmlformats.org/drawingml/2006/main" xmlns:r="http://schemas.openxmlformats.org/officeDocument/2006/relationships" xmlns:p="http://schemas.openxmlformats.org/presentationml/2006/main">
+  <p:cSld>
+    <p:spTree>
+      <p:nvGrpSpPr>
+        <p:cNvPr id="1" name=""/>
+        <p:cNvGrpSpPr/>
+        <p:nvPr/>
+      </p:nvGrpSpPr>
+      <p:grpSpPr>
+        <a:xfrm>
+          <a:off x="0" y="0"/>
+          <a:ext cx="0" cy="0"/>
+          <a:chOff x="0" y="0"/>
+          <a:chExt cx="0" cy="0"/>
+        </a:xfrm>
+      </p:grpSpPr>
+      <p:sp>
+        <p:nvSpPr>
+          <p:cNvPr id="4" name="Content Placeholder 3"/>
+          <p:cNvSpPr>
+            <a:spLocks noGrp="1"/>
+          </p:cNvSpPr>
+          <p:nvPr>
+            <p:ph sz="half" idx="2"/>
+          </p:nvPr>
+        </p:nvSpPr>
+        <p:spPr>
+          <a:xfrm>
+            <a:off x="683568" y="481236"/>
+            <a:ext cx="1080120" cy="504056"/>
+          </a:xfrm>
+        </p:spPr>
+        <p:txBody>
+          <a:bodyPr>
+            <a:normAutofit/>
+          </a:bodyPr>
+          <a:lstStyle/>
+          <a:p>
+            <a:pPr>
+              <a:buNone/>
+            </a:pPr>
+            <a:r>
+              <a:rPr lang="en-IN" sz="1800" b="1" dirty="0" smtClean="0">
+                <a:latin typeface="Segoe UI" pitchFamily="34" charset="0"/>
+                <a:cs typeface="Segoe UI" pitchFamily="34" charset="0"/>
+              </a:rPr>
+              <a:t>Recipes</a:t>
+            </a:r>
+          </a:p>
+        </p:txBody>
+      </p:sp>
+    </p:spTree>
+  </p:cSld>
+  <p:clrMapOvr>
+    <a:masterClrMapping/>
+  </p:clrMapOvr>
+  <p:timing>
+    <p:tnLst>
+      <p:par>
+        <p:cTn id="1" dur="indefinite" restart="never" nodeType="tmRoot"/>
+      </p:par>
+    </p:tnLst>
+  </p:timing>
+</p:sld>
+</file>
+
+<file path=ppt/slides/slide23.xml><?xml version="1.0" encoding="utf-8"?>
+<p:sld xmlns:a="http://schemas.openxmlformats.org/drawingml/2006/main" xmlns:r="http://schemas.openxmlformats.org/officeDocument/2006/relationships" xmlns:p="http://schemas.openxmlformats.org/presentationml/2006/main">
+  <p:cSld>
+    <p:spTree>
+      <p:nvGrpSpPr>
+        <p:cNvPr id="1" name=""/>
+        <p:cNvGrpSpPr/>
+        <p:nvPr/>
+      </p:nvGrpSpPr>
+      <p:grpSpPr>
+        <a:xfrm>
+          <a:off x="0" y="0"/>
+          <a:ext cx="0" cy="0"/>
+          <a:chOff x="0" y="0"/>
+          <a:chExt cx="0" cy="0"/>
+        </a:xfrm>
+      </p:grpSpPr>
+      <p:sp>
+        <p:nvSpPr>
+          <p:cNvPr id="4" name="Content Placeholder 3"/>
+          <p:cNvSpPr>
+            <a:spLocks noGrp="1"/>
+          </p:cNvSpPr>
+          <p:nvPr>
+            <p:ph sz="half" idx="2"/>
+          </p:nvPr>
+        </p:nvSpPr>
+        <p:spPr>
+          <a:xfrm>
+            <a:off x="683568" y="481236"/>
+            <a:ext cx="1512168" cy="504056"/>
+          </a:xfrm>
+        </p:spPr>
+        <p:txBody>
+          <a:bodyPr>
+            <a:normAutofit/>
+          </a:bodyPr>
+          <a:lstStyle/>
+          <a:p>
+            <a:pPr>
+              <a:buNone/>
+            </a:pPr>
+            <a:r>
+              <a:rPr lang="en-IN" sz="1800" b="1" dirty="0" smtClean="0">
+                <a:latin typeface="Segoe UI" pitchFamily="34" charset="0"/>
+                <a:cs typeface="Segoe UI" pitchFamily="34" charset="0"/>
+              </a:rPr>
+              <a:t>Frequency</a:t>
+            </a:r>
+          </a:p>
+        </p:txBody>
+      </p:sp>
+    </p:spTree>
+  </p:cSld>
+  <p:clrMapOvr>
+    <a:masterClrMapping/>
+  </p:clrMapOvr>
+  <p:timing>
+    <p:tnLst>
+      <p:par>
+        <p:cTn id="1" dur="indefinite" restart="never" nodeType="tmRoot"/>
+      </p:par>
+    </p:tnLst>
+  </p:timing>
+</p:sld>
+</file>
+
+<file path=ppt/slides/slide24.xml><?xml version="1.0" encoding="utf-8"?>
 <p:sld xmlns:a="http://schemas.openxmlformats.org/drawingml/2006/main" xmlns:r="http://schemas.openxmlformats.org/officeDocument/2006/relationships" xmlns:p="http://schemas.openxmlformats.org/presentationml/2006/main">
   <p:cSld>
     <p:spTree>
@@ -4892,7 +5018,7 @@
             <p:cNvPr id="8" name="TextBox 7">
               <a:extLst>
                 <a:ext uri="{FF2B5EF4-FFF2-40B4-BE49-F238E27FC236}">
-                  <a16:creationId xmlns="" xmlns:a16="http://schemas.microsoft.com/office/drawing/2014/main" id="{9674CE2F-8E4B-4E87-8AD5-2A4452B2662D}"/>
+                  <a16:creationId xmlns:a16="http://schemas.microsoft.com/office/drawing/2014/main" xmlns="" id="{9674CE2F-8E4B-4E87-8AD5-2A4452B2662D}"/>
                 </a:ext>
               </a:extLst>
             </p:cNvPr>
@@ -5063,7 +5189,7 @@
           <a:lstStyle/>
           <a:p>
             <a:r>
-              <a:rPr lang="en-IN" sz="1800" dirty="0" smtClean="0">
+              <a:rPr lang="en-IN" sz="1600" dirty="0" smtClean="0">
                 <a:latin typeface="Segoe UI" pitchFamily="34" charset="0"/>
                 <a:cs typeface="Segoe UI" pitchFamily="34" charset="0"/>
               </a:rPr>
@@ -5072,23 +5198,12 @@
           </a:p>
           <a:p>
             <a:r>
-              <a:rPr lang="en-IN" sz="1800" dirty="0" smtClean="0">
+              <a:rPr lang="en-IN" sz="1600" dirty="0" smtClean="0">
                 <a:latin typeface="Segoe UI" pitchFamily="34" charset="0"/>
                 <a:cs typeface="Segoe UI" pitchFamily="34" charset="0"/>
               </a:rPr>
-              <a:t>Show the frequency of each recipe </a:t>
-            </a:r>
-            <a:r>
-              <a:rPr lang="en-IN" sz="1800" dirty="0" smtClean="0">
-                <a:latin typeface="Segoe UI" pitchFamily="34" charset="0"/>
-                <a:cs typeface="Segoe UI" pitchFamily="34" charset="0"/>
-              </a:rPr>
-              <a:t>run in respective equipment(s)/chamber(s).</a:t>
-            </a:r>
-            <a:endParaRPr lang="en-IN" sz="1800" dirty="0" smtClean="0">
-              <a:latin typeface="Segoe UI" pitchFamily="34" charset="0"/>
-              <a:cs typeface="Segoe UI" pitchFamily="34" charset="0"/>
-            </a:endParaRPr>
+              <a:t>Show the frequency of each recipe run in respective equipment(s)/chamber(s).</a:t>
+            </a:r>
           </a:p>
         </p:txBody>
       </p:sp>
@@ -5097,6 +5212,13 @@
   <p:clrMapOvr>
     <a:masterClrMapping/>
   </p:clrMapOvr>
+  <p:timing>
+    <p:tnLst>
+      <p:par>
+        <p:cTn id="1" dur="indefinite" restart="never" nodeType="tmRoot"/>
+      </p:par>
+    </p:tnLst>
+  </p:timing>
 </p:sld>
 </file>
 
@@ -5119,53 +5241,140 @@
       </p:grpSpPr>
       <p:sp>
         <p:nvSpPr>
-          <p:cNvPr id="4" name="TextBox 3"/>
-          <p:cNvSpPr txBox="1"/>
+          <p:cNvPr id="2" name="Title 1"/>
+          <p:cNvSpPr>
+            <a:spLocks noGrp="1"/>
+          </p:cNvSpPr>
+          <p:nvPr>
+            <p:ph type="title"/>
+          </p:nvPr>
+        </p:nvSpPr>
+        <p:spPr/>
+        <p:txBody>
+          <a:bodyPr>
+            <a:normAutofit/>
+          </a:bodyPr>
+          <a:lstStyle/>
+          <a:p>
+            <a:pPr algn="l"/>
+            <a:r>
+              <a:rPr lang="en-IN" sz="2800" dirty="0" smtClean="0">
+                <a:latin typeface="Arial" pitchFamily="34" charset="0"/>
+                <a:cs typeface="Arial" pitchFamily="34" charset="0"/>
+              </a:rPr>
+              <a:t>Raw Data</a:t>
+            </a:r>
+            <a:endParaRPr lang="en-US" sz="2800" dirty="0">
+              <a:latin typeface="Arial" pitchFamily="34" charset="0"/>
+              <a:cs typeface="Arial" pitchFamily="34" charset="0"/>
+            </a:endParaRPr>
+          </a:p>
+        </p:txBody>
+      </p:sp>
+      <p:pic>
+        <p:nvPicPr>
+          <p:cNvPr id="1026" name="Picture 2"/>
+          <p:cNvPicPr>
+            <a:picLocks noChangeAspect="1" noChangeArrowheads="1"/>
+          </p:cNvPicPr>
           <p:nvPr/>
-        </p:nvSpPr>
-        <p:spPr>
+        </p:nvPicPr>
+        <p:blipFill>
+          <a:blip r:embed="rId2" cstate="print"/>
+          <a:srcRect/>
+          <a:stretch>
+            <a:fillRect/>
+          </a:stretch>
+        </p:blipFill>
+        <p:spPr bwMode="auto">
           <a:xfrm>
-            <a:off x="4067944" y="2641476"/>
-            <a:ext cx="1800200" cy="369332"/>
+            <a:off x="1331640" y="2065412"/>
+            <a:ext cx="6480720" cy="3487887"/>
           </a:xfrm>
           <a:prstGeom prst="rect">
             <a:avLst/>
           </a:prstGeom>
-          <a:solidFill>
-            <a:schemeClr val="accent3"/>
-          </a:solidFill>
-          <a:ln>
-            <a:noFill/>
+          <a:ln w="38100" cap="sq">
+            <a:solidFill>
+              <a:srgbClr val="000000"/>
+            </a:solidFill>
+            <a:prstDash val="solid"/>
+            <a:miter lim="800000"/>
           </a:ln>
           <a:effectLst>
             <a:outerShdw blurRad="50800" dist="38100" dir="2700000" algn="tl" rotWithShape="0">
-              <a:prstClr val="black">
-                <a:alpha val="40000"/>
-              </a:prstClr>
+              <a:srgbClr val="000000">
+                <a:alpha val="43000"/>
+              </a:srgbClr>
             </a:outerShdw>
           </a:effectLst>
         </p:spPr>
-        <p:txBody>
-          <a:bodyPr wrap="square" rtlCol="0">
-            <a:spAutoFit/>
+      </p:pic>
+      <p:sp>
+        <p:nvSpPr>
+          <p:cNvPr id="6" name="Content Placeholder 3"/>
+          <p:cNvSpPr>
+            <a:spLocks noGrp="1"/>
+          </p:cNvSpPr>
+          <p:nvPr>
+            <p:ph sz="half" idx="2"/>
+          </p:nvPr>
+        </p:nvSpPr>
+        <p:spPr>
+          <a:xfrm>
+            <a:off x="395536" y="1273324"/>
+            <a:ext cx="8496944" cy="720080"/>
+          </a:xfrm>
+        </p:spPr>
+        <p:txBody>
+          <a:bodyPr>
+            <a:normAutofit/>
           </a:bodyPr>
           <a:lstStyle/>
           <a:p>
-            <a:pPr algn="ctr"/>
-            <a:r>
-              <a:rPr lang="en-IN" dirty="0" smtClean="0">
-                <a:solidFill>
-                  <a:schemeClr val="bg1"/>
-                </a:solidFill>
+            <a:r>
+              <a:rPr lang="en-IN" sz="1600" dirty="0" smtClean="0">
                 <a:latin typeface="Segoe UI" pitchFamily="34" charset="0"/>
                 <a:cs typeface="Segoe UI" pitchFamily="34" charset="0"/>
               </a:rPr>
-              <a:t>ASBE1</a:t>
-            </a:r>
-            <a:endParaRPr lang="en-US" dirty="0">
-              <a:solidFill>
-                <a:schemeClr val="bg1"/>
-              </a:solidFill>
+              <a:t>It contains </a:t>
+            </a:r>
+            <a:r>
+              <a:rPr lang="en-IN" sz="1600" b="1" dirty="0" smtClean="0">
+                <a:latin typeface="Segoe UI" pitchFamily="34" charset="0"/>
+                <a:cs typeface="Segoe UI" pitchFamily="34" charset="0"/>
+              </a:rPr>
+              <a:t>17,284</a:t>
+            </a:r>
+            <a:r>
+              <a:rPr lang="en-IN" sz="1600" dirty="0" smtClean="0">
+                <a:latin typeface="Segoe UI" pitchFamily="34" charset="0"/>
+                <a:cs typeface="Segoe UI" pitchFamily="34" charset="0"/>
+              </a:rPr>
+              <a:t> rows &amp; </a:t>
+            </a:r>
+            <a:r>
+              <a:rPr lang="en-IN" sz="1600" b="1" dirty="0" smtClean="0">
+                <a:latin typeface="Segoe UI" pitchFamily="34" charset="0"/>
+                <a:cs typeface="Segoe UI" pitchFamily="34" charset="0"/>
+              </a:rPr>
+              <a:t>4</a:t>
+            </a:r>
+            <a:r>
+              <a:rPr lang="en-IN" sz="1600" dirty="0" smtClean="0">
+                <a:latin typeface="Segoe UI" pitchFamily="34" charset="0"/>
+                <a:cs typeface="Segoe UI" pitchFamily="34" charset="0"/>
+              </a:rPr>
+              <a:t> columns. So, the only procedure </a:t>
+            </a:r>
+            <a:r>
+              <a:rPr lang="en-IN" sz="1600" dirty="0" smtClean="0">
+                <a:latin typeface="Segoe UI" pitchFamily="34" charset="0"/>
+                <a:cs typeface="Segoe UI" pitchFamily="34" charset="0"/>
+              </a:rPr>
+              <a:t>to extract meaningful information is using scripts.</a:t>
+            </a:r>
+            <a:endParaRPr lang="en-IN" sz="1600" dirty="0" smtClean="0">
               <a:latin typeface="Segoe UI" pitchFamily="34" charset="0"/>
               <a:cs typeface="Segoe UI" pitchFamily="34" charset="0"/>
             </a:endParaRPr>
@@ -5206,6 +5415,234 @@
       </p:grpSpPr>
       <p:sp>
         <p:nvSpPr>
+          <p:cNvPr id="2" name="Title 1"/>
+          <p:cNvSpPr>
+            <a:spLocks noGrp="1"/>
+          </p:cNvSpPr>
+          <p:nvPr>
+            <p:ph type="title"/>
+          </p:nvPr>
+        </p:nvSpPr>
+        <p:spPr/>
+        <p:txBody>
+          <a:bodyPr>
+            <a:normAutofit/>
+          </a:bodyPr>
+          <a:lstStyle/>
+          <a:p>
+            <a:pPr algn="l"/>
+            <a:r>
+              <a:rPr lang="en-IN" sz="2800" dirty="0" smtClean="0">
+                <a:latin typeface="Arial" pitchFamily="34" charset="0"/>
+                <a:cs typeface="Arial" pitchFamily="34" charset="0"/>
+              </a:rPr>
+              <a:t>Data Analysis Procedure</a:t>
+            </a:r>
+            <a:endParaRPr lang="en-US" sz="2800" dirty="0">
+              <a:latin typeface="Arial" pitchFamily="34" charset="0"/>
+              <a:cs typeface="Arial" pitchFamily="34" charset="0"/>
+            </a:endParaRPr>
+          </a:p>
+        </p:txBody>
+      </p:sp>
+      <p:sp>
+        <p:nvSpPr>
+          <p:cNvPr id="4" name="Content Placeholder 3"/>
+          <p:cNvSpPr>
+            <a:spLocks noGrp="1"/>
+          </p:cNvSpPr>
+          <p:nvPr>
+            <p:ph sz="half" idx="2"/>
+          </p:nvPr>
+        </p:nvSpPr>
+        <p:spPr>
+          <a:xfrm>
+            <a:off x="395536" y="1273324"/>
+            <a:ext cx="8435280" cy="1368152"/>
+          </a:xfrm>
+        </p:spPr>
+        <p:txBody>
+          <a:bodyPr>
+            <a:normAutofit/>
+          </a:bodyPr>
+          <a:lstStyle/>
+          <a:p>
+            <a:r>
+              <a:rPr lang="en-IN" sz="1600" b="1" u="sng" dirty="0" smtClean="0">
+                <a:latin typeface="Segoe UI" pitchFamily="34" charset="0"/>
+                <a:cs typeface="Segoe UI" pitchFamily="34" charset="0"/>
+              </a:rPr>
+              <a:t>Cleaning:</a:t>
+            </a:r>
+            <a:r>
+              <a:rPr lang="en-IN" sz="1600" dirty="0" smtClean="0">
+                <a:latin typeface="Segoe UI" pitchFamily="34" charset="0"/>
+                <a:cs typeface="Segoe UI" pitchFamily="34" charset="0"/>
+              </a:rPr>
+              <a:t> strip whitespaces in each cell data from front &amp; rear side.</a:t>
+            </a:r>
+            <a:endParaRPr lang="en-IN" sz="1600" dirty="0" smtClean="0">
+              <a:latin typeface="Segoe UI" pitchFamily="34" charset="0"/>
+              <a:cs typeface="Segoe UI" pitchFamily="34" charset="0"/>
+            </a:endParaRPr>
+          </a:p>
+          <a:p>
+            <a:r>
+              <a:rPr lang="en-IN" sz="1600" b="1" u="sng" dirty="0" smtClean="0">
+                <a:latin typeface="Segoe UI" pitchFamily="34" charset="0"/>
+                <a:cs typeface="Segoe UI" pitchFamily="34" charset="0"/>
+              </a:rPr>
+              <a:t>Wrangling:</a:t>
+            </a:r>
+            <a:r>
+              <a:rPr lang="en-IN" sz="1600" dirty="0" smtClean="0">
+                <a:latin typeface="Segoe UI" pitchFamily="34" charset="0"/>
+                <a:cs typeface="Segoe UI" pitchFamily="34" charset="0"/>
+              </a:rPr>
+              <a:t> filter out the recipes of each equipment/chamber by name in “</a:t>
+            </a:r>
+            <a:r>
+              <a:rPr lang="en-IN" sz="1600" dirty="0" err="1" smtClean="0">
+                <a:latin typeface="Segoe UI" pitchFamily="34" charset="0"/>
+                <a:cs typeface="Segoe UI" pitchFamily="34" charset="0"/>
+              </a:rPr>
+              <a:t>EquipID</a:t>
+            </a:r>
+            <a:r>
+              <a:rPr lang="en-IN" sz="1600" dirty="0" smtClean="0">
+                <a:latin typeface="Segoe UI" pitchFamily="34" charset="0"/>
+                <a:cs typeface="Segoe UI" pitchFamily="34" charset="0"/>
+              </a:rPr>
+              <a:t>” column.</a:t>
+            </a:r>
+            <a:endParaRPr lang="en-IN" sz="1600" b="1" u="sng" dirty="0" smtClean="0">
+              <a:latin typeface="Segoe UI" pitchFamily="34" charset="0"/>
+              <a:cs typeface="Segoe UI" pitchFamily="34" charset="0"/>
+            </a:endParaRPr>
+          </a:p>
+        </p:txBody>
+      </p:sp>
+    </p:spTree>
+  </p:cSld>
+  <p:clrMapOvr>
+    <a:masterClrMapping/>
+  </p:clrMapOvr>
+  <p:timing>
+    <p:tnLst>
+      <p:par>
+        <p:cTn id="1" dur="indefinite" restart="never" nodeType="tmRoot"/>
+      </p:par>
+    </p:tnLst>
+  </p:timing>
+</p:sld>
+</file>
+
+<file path=ppt/slides/slide6.xml><?xml version="1.0" encoding="utf-8"?>
+<p:sld xmlns:a="http://schemas.openxmlformats.org/drawingml/2006/main" xmlns:r="http://schemas.openxmlformats.org/officeDocument/2006/relationships" xmlns:p="http://schemas.openxmlformats.org/presentationml/2006/main">
+  <p:cSld>
+    <p:spTree>
+      <p:nvGrpSpPr>
+        <p:cNvPr id="1" name=""/>
+        <p:cNvGrpSpPr/>
+        <p:nvPr/>
+      </p:nvGrpSpPr>
+      <p:grpSpPr>
+        <a:xfrm>
+          <a:off x="0" y="0"/>
+          <a:ext cx="0" cy="0"/>
+          <a:chOff x="0" y="0"/>
+          <a:chExt cx="0" cy="0"/>
+        </a:xfrm>
+      </p:grpSpPr>
+      <p:sp>
+        <p:nvSpPr>
+          <p:cNvPr id="4" name="TextBox 3"/>
+          <p:cNvSpPr txBox="1"/>
+          <p:nvPr/>
+        </p:nvSpPr>
+        <p:spPr>
+          <a:xfrm>
+            <a:off x="4067944" y="2641476"/>
+            <a:ext cx="1800200" cy="369332"/>
+          </a:xfrm>
+          <a:prstGeom prst="rect">
+            <a:avLst/>
+          </a:prstGeom>
+          <a:solidFill>
+            <a:schemeClr val="accent3"/>
+          </a:solidFill>
+          <a:ln>
+            <a:noFill/>
+          </a:ln>
+          <a:effectLst>
+            <a:outerShdw blurRad="50800" dist="38100" dir="2700000" algn="tl" rotWithShape="0">
+              <a:prstClr val="black">
+                <a:alpha val="40000"/>
+              </a:prstClr>
+            </a:outerShdw>
+          </a:effectLst>
+        </p:spPr>
+        <p:txBody>
+          <a:bodyPr wrap="square" rtlCol="0">
+            <a:spAutoFit/>
+          </a:bodyPr>
+          <a:lstStyle/>
+          <a:p>
+            <a:pPr algn="ctr"/>
+            <a:r>
+              <a:rPr lang="en-IN" dirty="0" smtClean="0">
+                <a:solidFill>
+                  <a:schemeClr val="bg1"/>
+                </a:solidFill>
+                <a:latin typeface="Segoe UI" pitchFamily="34" charset="0"/>
+                <a:cs typeface="Segoe UI" pitchFamily="34" charset="0"/>
+              </a:rPr>
+              <a:t>ASBE1</a:t>
+            </a:r>
+            <a:endParaRPr lang="en-US" dirty="0">
+              <a:solidFill>
+                <a:schemeClr val="bg1"/>
+              </a:solidFill>
+              <a:latin typeface="Segoe UI" pitchFamily="34" charset="0"/>
+              <a:cs typeface="Segoe UI" pitchFamily="34" charset="0"/>
+            </a:endParaRPr>
+          </a:p>
+        </p:txBody>
+      </p:sp>
+    </p:spTree>
+  </p:cSld>
+  <p:clrMapOvr>
+    <a:masterClrMapping/>
+  </p:clrMapOvr>
+  <p:timing>
+    <p:tnLst>
+      <p:par>
+        <p:cTn id="1" dur="indefinite" restart="never" nodeType="tmRoot"/>
+      </p:par>
+    </p:tnLst>
+  </p:timing>
+</p:sld>
+</file>
+
+<file path=ppt/slides/slide7.xml><?xml version="1.0" encoding="utf-8"?>
+<p:sld xmlns:a="http://schemas.openxmlformats.org/drawingml/2006/main" xmlns:r="http://schemas.openxmlformats.org/officeDocument/2006/relationships" xmlns:p="http://schemas.openxmlformats.org/presentationml/2006/main">
+  <p:cSld>
+    <p:spTree>
+      <p:nvGrpSpPr>
+        <p:cNvPr id="1" name=""/>
+        <p:cNvGrpSpPr/>
+        <p:nvPr/>
+      </p:nvGrpSpPr>
+      <p:grpSpPr>
+        <a:xfrm>
+          <a:off x="0" y="0"/>
+          <a:ext cx="0" cy="0"/>
+          <a:chOff x="0" y="0"/>
+          <a:chExt cx="0" cy="0"/>
+        </a:xfrm>
+      </p:grpSpPr>
+      <p:sp>
+        <p:nvSpPr>
           <p:cNvPr id="4" name="Content Placeholder 3"/>
           <p:cNvSpPr>
             <a:spLocks noGrp="1"/>
@@ -5236,10 +5673,6 @@
               </a:rPr>
               <a:t>Recipes</a:t>
             </a:r>
-            <a:endParaRPr lang="en-IN" sz="1800" b="1" dirty="0" smtClean="0">
-              <a:latin typeface="Segoe UI" pitchFamily="34" charset="0"/>
-              <a:cs typeface="Segoe UI" pitchFamily="34" charset="0"/>
-            </a:endParaRPr>
           </a:p>
         </p:txBody>
       </p:sp>
@@ -5290,164 +5723,6 @@
 </p:sld>
 </file>
 
-<file path=ppt/slides/slide6.xml><?xml version="1.0" encoding="utf-8"?>
-<p:sld xmlns:a="http://schemas.openxmlformats.org/drawingml/2006/main" xmlns:r="http://schemas.openxmlformats.org/officeDocument/2006/relationships" xmlns:p="http://schemas.openxmlformats.org/presentationml/2006/main">
-  <p:cSld>
-    <p:spTree>
-      <p:nvGrpSpPr>
-        <p:cNvPr id="1" name=""/>
-        <p:cNvGrpSpPr/>
-        <p:nvPr/>
-      </p:nvGrpSpPr>
-      <p:grpSpPr>
-        <a:xfrm>
-          <a:off x="0" y="0"/>
-          <a:ext cx="0" cy="0"/>
-          <a:chOff x="0" y="0"/>
-          <a:chExt cx="0" cy="0"/>
-        </a:xfrm>
-      </p:grpSpPr>
-      <p:sp>
-        <p:nvSpPr>
-          <p:cNvPr id="4" name="Content Placeholder 3"/>
-          <p:cNvSpPr>
-            <a:spLocks noGrp="1"/>
-          </p:cNvSpPr>
-          <p:nvPr>
-            <p:ph sz="half" idx="2"/>
-          </p:nvPr>
-        </p:nvSpPr>
-        <p:spPr>
-          <a:xfrm>
-            <a:off x="683568" y="481236"/>
-            <a:ext cx="1512168" cy="504056"/>
-          </a:xfrm>
-        </p:spPr>
-        <p:txBody>
-          <a:bodyPr>
-            <a:normAutofit/>
-          </a:bodyPr>
-          <a:lstStyle/>
-          <a:p>
-            <a:pPr>
-              <a:buNone/>
-            </a:pPr>
-            <a:r>
-              <a:rPr lang="en-IN" sz="1800" b="1" dirty="0" smtClean="0">
-                <a:latin typeface="Segoe UI" pitchFamily="34" charset="0"/>
-                <a:cs typeface="Segoe UI" pitchFamily="34" charset="0"/>
-              </a:rPr>
-              <a:t>Frequency</a:t>
-            </a:r>
-            <a:endParaRPr lang="en-IN" sz="1800" b="1" dirty="0" smtClean="0">
-              <a:latin typeface="Segoe UI" pitchFamily="34" charset="0"/>
-              <a:cs typeface="Segoe UI" pitchFamily="34" charset="0"/>
-            </a:endParaRPr>
-          </a:p>
-        </p:txBody>
-      </p:sp>
-    </p:spTree>
-  </p:cSld>
-  <p:clrMapOvr>
-    <a:masterClrMapping/>
-  </p:clrMapOvr>
-  <p:timing>
-    <p:tnLst>
-      <p:par>
-        <p:cTn id="1" dur="indefinite" restart="never" nodeType="tmRoot"/>
-      </p:par>
-    </p:tnLst>
-  </p:timing>
-</p:sld>
-</file>
-
-<file path=ppt/slides/slide7.xml><?xml version="1.0" encoding="utf-8"?>
-<p:sld xmlns:a="http://schemas.openxmlformats.org/drawingml/2006/main" xmlns:r="http://schemas.openxmlformats.org/officeDocument/2006/relationships" xmlns:p="http://schemas.openxmlformats.org/presentationml/2006/main">
-  <p:cSld>
-    <p:spTree>
-      <p:nvGrpSpPr>
-        <p:cNvPr id="1" name=""/>
-        <p:cNvGrpSpPr/>
-        <p:nvPr/>
-      </p:nvGrpSpPr>
-      <p:grpSpPr>
-        <a:xfrm>
-          <a:off x="0" y="0"/>
-          <a:ext cx="0" cy="0"/>
-          <a:chOff x="0" y="0"/>
-          <a:chExt cx="0" cy="0"/>
-        </a:xfrm>
-      </p:grpSpPr>
-      <p:sp>
-        <p:nvSpPr>
-          <p:cNvPr id="4" name="TextBox 3"/>
-          <p:cNvSpPr txBox="1"/>
-          <p:nvPr/>
-        </p:nvSpPr>
-        <p:spPr>
-          <a:xfrm>
-            <a:off x="4067944" y="2641476"/>
-            <a:ext cx="1800200" cy="369332"/>
-          </a:xfrm>
-          <a:prstGeom prst="rect">
-            <a:avLst/>
-          </a:prstGeom>
-          <a:solidFill>
-            <a:schemeClr val="accent4"/>
-          </a:solidFill>
-          <a:ln>
-            <a:noFill/>
-          </a:ln>
-          <a:effectLst>
-            <a:outerShdw blurRad="50800" dist="38100" dir="2700000" algn="tl" rotWithShape="0">
-              <a:prstClr val="black">
-                <a:alpha val="40000"/>
-              </a:prstClr>
-            </a:outerShdw>
-          </a:effectLst>
-        </p:spPr>
-        <p:txBody>
-          <a:bodyPr wrap="square" rtlCol="0">
-            <a:spAutoFit/>
-          </a:bodyPr>
-          <a:lstStyle/>
-          <a:p>
-            <a:pPr algn="ctr"/>
-            <a:r>
-              <a:rPr lang="en-IN" dirty="0" smtClean="0">
-                <a:solidFill>
-                  <a:schemeClr val="bg1"/>
-                </a:solidFill>
-                <a:latin typeface="Segoe UI" pitchFamily="34" charset="0"/>
-                <a:cs typeface="Segoe UI" pitchFamily="34" charset="0"/>
-              </a:rPr>
-              <a:t>ASFE1</a:t>
-            </a:r>
-            <a:endParaRPr lang="en-US" dirty="0">
-              <a:solidFill>
-                <a:schemeClr val="bg1"/>
-              </a:solidFill>
-              <a:latin typeface="Segoe UI" pitchFamily="34" charset="0"/>
-              <a:cs typeface="Segoe UI" pitchFamily="34" charset="0"/>
-            </a:endParaRPr>
-          </a:p>
-        </p:txBody>
-      </p:sp>
-    </p:spTree>
-  </p:cSld>
-  <p:clrMapOvr>
-    <a:masterClrMapping/>
-  </p:clrMapOvr>
-  <p:timing>
-    <p:tnLst>
-      <p:par>
-        <p:cTn id="1" dur="indefinite" restart="never" nodeType="tmRoot"/>
-      </p:par>
-    </p:tnLst>
-  </p:timing>
-</p:sld>
-</file>
-
 <file path=ppt/slides/slide8.xml><?xml version="1.0" encoding="utf-8"?>
 <p:sld xmlns:a="http://schemas.openxmlformats.org/drawingml/2006/main" xmlns:r="http://schemas.openxmlformats.org/officeDocument/2006/relationships" xmlns:p="http://schemas.openxmlformats.org/presentationml/2006/main">
   <p:cSld>
@@ -5478,7 +5753,7 @@
         <p:spPr>
           <a:xfrm>
             <a:off x="683568" y="481236"/>
-            <a:ext cx="1080120" cy="504056"/>
+            <a:ext cx="1512168" cy="504056"/>
           </a:xfrm>
         </p:spPr>
         <p:txBody>
@@ -5495,47 +5770,11 @@
                 <a:latin typeface="Segoe UI" pitchFamily="34" charset="0"/>
                 <a:cs typeface="Segoe UI" pitchFamily="34" charset="0"/>
               </a:rPr>
-              <a:t>Recipes</a:t>
-            </a:r>
-            <a:endParaRPr lang="en-IN" sz="1800" b="1" dirty="0" smtClean="0">
-              <a:latin typeface="Segoe UI" pitchFamily="34" charset="0"/>
-              <a:cs typeface="Segoe UI" pitchFamily="34" charset="0"/>
-            </a:endParaRPr>
-          </a:p>
-        </p:txBody>
-      </p:sp>
-      <p:pic>
-        <p:nvPicPr>
-          <p:cNvPr id="2050" name="Picture 2"/>
-          <p:cNvPicPr>
-            <a:picLocks noChangeAspect="1" noChangeArrowheads="1"/>
-          </p:cNvPicPr>
-          <p:nvPr/>
-        </p:nvPicPr>
-        <p:blipFill>
-          <a:blip r:embed="rId2" cstate="print"/>
-          <a:srcRect l="5529" t="4803" r="6012" b="3912"/>
-          <a:stretch>
-            <a:fillRect/>
-          </a:stretch>
-        </p:blipFill>
-        <p:spPr bwMode="auto">
-          <a:xfrm>
-            <a:off x="3059832" y="121195"/>
-            <a:ext cx="3816424" cy="5565619"/>
-          </a:xfrm>
-          <a:prstGeom prst="rect">
-            <a:avLst/>
-          </a:prstGeom>
-          <a:noFill/>
-          <a:ln w="9525">
-            <a:noFill/>
-            <a:miter lim="800000"/>
-            <a:headEnd/>
-            <a:tailEnd/>
-          </a:ln>
-        </p:spPr>
-      </p:pic>
+              <a:t>Frequency</a:t>
+            </a:r>
+          </a:p>
+        </p:txBody>
+      </p:sp>
     </p:spTree>
   </p:cSld>
   <p:clrMapOvr>
@@ -5570,37 +5809,53 @@
       </p:grpSpPr>
       <p:sp>
         <p:nvSpPr>
-          <p:cNvPr id="4" name="Content Placeholder 3"/>
-          <p:cNvSpPr>
-            <a:spLocks noGrp="1"/>
-          </p:cNvSpPr>
-          <p:nvPr>
-            <p:ph sz="half" idx="2"/>
-          </p:nvPr>
+          <p:cNvPr id="4" name="TextBox 3"/>
+          <p:cNvSpPr txBox="1"/>
+          <p:nvPr/>
         </p:nvSpPr>
         <p:spPr>
           <a:xfrm>
-            <a:off x="683568" y="481236"/>
-            <a:ext cx="1512168" cy="504056"/>
+            <a:off x="4067944" y="2641476"/>
+            <a:ext cx="1800200" cy="369332"/>
           </a:xfrm>
+          <a:prstGeom prst="rect">
+            <a:avLst/>
+          </a:prstGeom>
+          <a:solidFill>
+            <a:schemeClr val="accent4"/>
+          </a:solidFill>
+          <a:ln>
+            <a:noFill/>
+          </a:ln>
+          <a:effectLst>
+            <a:outerShdw blurRad="50800" dist="38100" dir="2700000" algn="tl" rotWithShape="0">
+              <a:prstClr val="black">
+                <a:alpha val="40000"/>
+              </a:prstClr>
+            </a:outerShdw>
+          </a:effectLst>
         </p:spPr>
         <p:txBody>
-          <a:bodyPr>
-            <a:normAutofit/>
+          <a:bodyPr wrap="square" rtlCol="0">
+            <a:spAutoFit/>
           </a:bodyPr>
           <a:lstStyle/>
           <a:p>
-            <a:pPr>
-              <a:buNone/>
-            </a:pPr>
-            <a:r>
-              <a:rPr lang="en-IN" sz="1800" b="1" dirty="0" smtClean="0">
+            <a:pPr algn="ctr"/>
+            <a:r>
+              <a:rPr lang="en-IN" dirty="0" smtClean="0">
+                <a:solidFill>
+                  <a:schemeClr val="bg1"/>
+                </a:solidFill>
                 <a:latin typeface="Segoe UI" pitchFamily="34" charset="0"/>
                 <a:cs typeface="Segoe UI" pitchFamily="34" charset="0"/>
               </a:rPr>
-              <a:t>Frequency</a:t>
-            </a:r>
-            <a:endParaRPr lang="en-IN" sz="1800" b="1" dirty="0" smtClean="0">
+              <a:t>ASFE1</a:t>
+            </a:r>
+            <a:endParaRPr lang="en-US" dirty="0">
+              <a:solidFill>
+                <a:schemeClr val="bg1"/>
+              </a:solidFill>
               <a:latin typeface="Segoe UI" pitchFamily="34" charset="0"/>
               <a:cs typeface="Segoe UI" pitchFamily="34" charset="0"/>
             </a:endParaRPr>

</xml_diff>